<commit_message>
add wsd description to presentation
</commit_message>
<xml_diff>
--- a/presentetion.pptx
+++ b/presentetion.pptx
@@ -8052,6 +8052,13 @@
               <a:t>OpenCalais</a:t>
             </a:r>
             <a:r>
+              <a:rPr lang="ru-RU" sz="2000" b="1" dirty="0" smtClean="0">
+                <a:latin typeface="Segoe UI Light" panose="020B0502040204020203" pitchFamily="34" charset="0"/>
+                <a:cs typeface="Segoe UI Light" panose="020B0502040204020203" pitchFamily="34" charset="0"/>
+              </a:rPr>
+              <a:t> </a:t>
+            </a:r>
+            <a:r>
               <a:rPr lang="en-US" sz="2000" b="1" dirty="0" smtClean="0">
                 <a:latin typeface="Segoe UI Light" panose="020B0502040204020203" pitchFamily="34" charset="0"/>
                 <a:cs typeface="Segoe UI Light" panose="020B0502040204020203" pitchFamily="34" charset="0"/>
@@ -8914,7 +8921,7 @@
           <p:nvPr/>
         </p:nvPicPr>
         <p:blipFill rotWithShape="1">
-          <a:blip r:embed="rId3"/>
+          <a:blip r:embed="rId2"/>
           <a:srcRect r="9412"/>
           <a:stretch/>
         </p:blipFill>
@@ -8995,82 +9002,6 @@
           </a:p>
         </p:txBody>
       </p:sp>
-      <p:graphicFrame>
-        <p:nvGraphicFramePr>
-          <p:cNvPr id="5" name="Object 4"/>
-          <p:cNvGraphicFramePr>
-            <a:graphicFrameLocks noChangeAspect="1"/>
-          </p:cNvGraphicFramePr>
-          <p:nvPr>
-            <p:extLst>
-              <p:ext uri="{D42A27DB-BD31-4B8C-83A1-F6EECF244321}">
-                <p14:modId xmlns:p14="http://schemas.microsoft.com/office/powerpoint/2010/main" val="817302310"/>
-              </p:ext>
-            </p:extLst>
-          </p:nvPr>
-        </p:nvGraphicFramePr>
-        <p:xfrm>
-          <a:off x="3362325" y="2544416"/>
-          <a:ext cx="5467350" cy="4057650"/>
-        </p:xfrm>
-        <a:graphic>
-          <a:graphicData uri="http://schemas.openxmlformats.org/presentationml/2006/ole">
-            <mc:AlternateContent xmlns:mc="http://schemas.openxmlformats.org/markup-compatibility/2006">
-              <mc:Choice xmlns:v="urn:schemas-microsoft-com:vml" Requires="v">
-                <p:oleObj spid="_x0000_s8252" name="Visio" r:id="rId4" imgW="5467190" imgH="4057607" progId="Visio.Drawing.15">
-                  <p:embed/>
-                </p:oleObj>
-              </mc:Choice>
-              <mc:Fallback>
-                <p:oleObj name="Visio" r:id="rId4" imgW="5467190" imgH="4057607" progId="Visio.Drawing.15">
-                  <p:embed/>
-                  <p:pic>
-                    <p:nvPicPr>
-                      <p:cNvPr id="0" name="Object 1"/>
-                      <p:cNvPicPr>
-                        <a:picLocks noChangeAspect="1" noChangeArrowheads="1"/>
-                      </p:cNvPicPr>
-                      <p:nvPr/>
-                    </p:nvPicPr>
-                    <p:blipFill>
-                      <a:blip r:embed="rId5">
-                        <a:extLst>
-                          <a:ext uri="{28A0092B-C50C-407E-A947-70E740481C1C}">
-                            <a14:useLocalDpi xmlns:a14="http://schemas.microsoft.com/office/drawing/2010/main" val="0"/>
-                          </a:ext>
-                        </a:extLst>
-                      </a:blip>
-                      <a:srcRect/>
-                      <a:stretch>
-                        <a:fillRect/>
-                      </a:stretch>
-                    </p:blipFill>
-                    <p:spPr bwMode="auto">
-                      <a:xfrm>
-                        <a:off x="3362325" y="2544416"/>
-                        <a:ext cx="5467350" cy="4057650"/>
-                      </a:xfrm>
-                      <a:prstGeom prst="rect">
-                        <a:avLst/>
-                      </a:prstGeom>
-                      <a:noFill/>
-                      <a:extLst>
-                        <a:ext uri="{909E8E84-426E-40DD-AFC4-6F175D3DCCD1}">
-                          <a14:hiddenFill xmlns:a14="http://schemas.microsoft.com/office/drawing/2010/main">
-                            <a:solidFill>
-                              <a:srgbClr val="FFFFFF"/>
-                            </a:solidFill>
-                          </a14:hiddenFill>
-                        </a:ext>
-                      </a:extLst>
-                    </p:spPr>
-                  </p:pic>
-                </p:oleObj>
-              </mc:Fallback>
-            </mc:AlternateContent>
-          </a:graphicData>
-        </a:graphic>
-      </p:graphicFrame>
       <p:sp>
         <p:nvSpPr>
           <p:cNvPr id="6" name="Title 1"/>
@@ -9257,6 +9188,392 @@
               <a:t>Разрешение лексической многозначности при переводе</a:t>
             </a:r>
             <a:endParaRPr lang="en-US" b="1" dirty="0">
+              <a:latin typeface="Segoe UI Light" panose="020B0502040204020203" pitchFamily="34" charset="0"/>
+              <a:cs typeface="Segoe UI Light" panose="020B0502040204020203" pitchFamily="34" charset="0"/>
+            </a:endParaRPr>
+          </a:p>
+        </p:txBody>
+      </p:sp>
+      <p:sp>
+        <p:nvSpPr>
+          <p:cNvPr id="8" name="Content Placeholder 2"/>
+          <p:cNvSpPr txBox="1">
+            <a:spLocks/>
+          </p:cNvSpPr>
+          <p:nvPr/>
+        </p:nvSpPr>
+        <p:spPr>
+          <a:xfrm>
+            <a:off x="838200" y="3103397"/>
+            <a:ext cx="10309167" cy="3305715"/>
+          </a:xfrm>
+          <a:prstGeom prst="rect">
+            <a:avLst/>
+          </a:prstGeom>
+        </p:spPr>
+        <p:txBody>
+          <a:bodyPr/>
+          <a:lstStyle>
+            <a:lvl1pPr marL="228600" indent="-228600" algn="l" rtl="0" eaLnBrk="1" fontAlgn="base" hangingPunct="1">
+              <a:lnSpc>
+                <a:spcPct val="90000"/>
+              </a:lnSpc>
+              <a:spcBef>
+                <a:spcPts val="1000"/>
+              </a:spcBef>
+              <a:spcAft>
+                <a:spcPct val="0"/>
+              </a:spcAft>
+              <a:buFont typeface="Arial" panose="020B0604020202020204" pitchFamily="34" charset="0"/>
+              <a:buChar char="•"/>
+              <a:defRPr sz="2800" kern="1200">
+                <a:solidFill>
+                  <a:schemeClr val="tx1"/>
+                </a:solidFill>
+                <a:latin typeface="+mn-lt"/>
+                <a:ea typeface="+mn-ea"/>
+                <a:cs typeface="+mn-cs"/>
+              </a:defRPr>
+            </a:lvl1pPr>
+            <a:lvl2pPr marL="685800" indent="-228600" algn="l" rtl="0" eaLnBrk="1" fontAlgn="base" hangingPunct="1">
+              <a:lnSpc>
+                <a:spcPct val="90000"/>
+              </a:lnSpc>
+              <a:spcBef>
+                <a:spcPts val="500"/>
+              </a:spcBef>
+              <a:spcAft>
+                <a:spcPct val="0"/>
+              </a:spcAft>
+              <a:buFont typeface="Arial" panose="020B0604020202020204" pitchFamily="34" charset="0"/>
+              <a:buChar char="•"/>
+              <a:defRPr sz="2400" kern="1200">
+                <a:solidFill>
+                  <a:schemeClr val="tx1"/>
+                </a:solidFill>
+                <a:latin typeface="+mn-lt"/>
+                <a:ea typeface="+mn-ea"/>
+                <a:cs typeface="+mn-cs"/>
+              </a:defRPr>
+            </a:lvl2pPr>
+            <a:lvl3pPr marL="1143000" indent="-228600" algn="l" rtl="0" eaLnBrk="1" fontAlgn="base" hangingPunct="1">
+              <a:lnSpc>
+                <a:spcPct val="90000"/>
+              </a:lnSpc>
+              <a:spcBef>
+                <a:spcPts val="500"/>
+              </a:spcBef>
+              <a:spcAft>
+                <a:spcPct val="0"/>
+              </a:spcAft>
+              <a:buFont typeface="Arial" panose="020B0604020202020204" pitchFamily="34" charset="0"/>
+              <a:buChar char="•"/>
+              <a:defRPr sz="2000" kern="1200">
+                <a:solidFill>
+                  <a:schemeClr val="tx1"/>
+                </a:solidFill>
+                <a:latin typeface="+mn-lt"/>
+                <a:ea typeface="+mn-ea"/>
+                <a:cs typeface="+mn-cs"/>
+              </a:defRPr>
+            </a:lvl3pPr>
+            <a:lvl4pPr marL="1600200" indent="-228600" algn="l" rtl="0" eaLnBrk="1" fontAlgn="base" hangingPunct="1">
+              <a:lnSpc>
+                <a:spcPct val="90000"/>
+              </a:lnSpc>
+              <a:spcBef>
+                <a:spcPts val="500"/>
+              </a:spcBef>
+              <a:spcAft>
+                <a:spcPct val="0"/>
+              </a:spcAft>
+              <a:buFont typeface="Arial" panose="020B0604020202020204" pitchFamily="34" charset="0"/>
+              <a:buChar char="•"/>
+              <a:defRPr kern="1200">
+                <a:solidFill>
+                  <a:schemeClr val="tx1"/>
+                </a:solidFill>
+                <a:latin typeface="+mn-lt"/>
+                <a:ea typeface="+mn-ea"/>
+                <a:cs typeface="+mn-cs"/>
+              </a:defRPr>
+            </a:lvl4pPr>
+            <a:lvl5pPr marL="2057400" indent="-228600" algn="l" rtl="0" eaLnBrk="1" fontAlgn="base" hangingPunct="1">
+              <a:lnSpc>
+                <a:spcPct val="90000"/>
+              </a:lnSpc>
+              <a:spcBef>
+                <a:spcPts val="500"/>
+              </a:spcBef>
+              <a:spcAft>
+                <a:spcPct val="0"/>
+              </a:spcAft>
+              <a:buFont typeface="Arial" panose="020B0604020202020204" pitchFamily="34" charset="0"/>
+              <a:buChar char="•"/>
+              <a:defRPr kern="1200">
+                <a:solidFill>
+                  <a:schemeClr val="tx1"/>
+                </a:solidFill>
+                <a:latin typeface="+mn-lt"/>
+                <a:ea typeface="+mn-ea"/>
+                <a:cs typeface="+mn-cs"/>
+              </a:defRPr>
+            </a:lvl5pPr>
+            <a:lvl6pPr marL="2514600" indent="-228600" algn="l" defTabSz="914400" rtl="0" eaLnBrk="1" latinLnBrk="0" hangingPunct="1">
+              <a:lnSpc>
+                <a:spcPct val="90000"/>
+              </a:lnSpc>
+              <a:spcBef>
+                <a:spcPts val="500"/>
+              </a:spcBef>
+              <a:buFont typeface="Arial" panose="020B0604020202020204" pitchFamily="34" charset="0"/>
+              <a:buChar char="•"/>
+              <a:defRPr sz="1800" kern="1200">
+                <a:solidFill>
+                  <a:schemeClr val="tx1"/>
+                </a:solidFill>
+                <a:latin typeface="+mn-lt"/>
+                <a:ea typeface="+mn-ea"/>
+                <a:cs typeface="+mn-cs"/>
+              </a:defRPr>
+            </a:lvl6pPr>
+            <a:lvl7pPr marL="2971800" indent="-228600" algn="l" defTabSz="914400" rtl="0" eaLnBrk="1" latinLnBrk="0" hangingPunct="1">
+              <a:lnSpc>
+                <a:spcPct val="90000"/>
+              </a:lnSpc>
+              <a:spcBef>
+                <a:spcPts val="500"/>
+              </a:spcBef>
+              <a:buFont typeface="Arial" panose="020B0604020202020204" pitchFamily="34" charset="0"/>
+              <a:buChar char="•"/>
+              <a:defRPr sz="1800" kern="1200">
+                <a:solidFill>
+                  <a:schemeClr val="tx1"/>
+                </a:solidFill>
+                <a:latin typeface="+mn-lt"/>
+                <a:ea typeface="+mn-ea"/>
+                <a:cs typeface="+mn-cs"/>
+              </a:defRPr>
+            </a:lvl7pPr>
+            <a:lvl8pPr marL="3429000" indent="-228600" algn="l" defTabSz="914400" rtl="0" eaLnBrk="1" latinLnBrk="0" hangingPunct="1">
+              <a:lnSpc>
+                <a:spcPct val="90000"/>
+              </a:lnSpc>
+              <a:spcBef>
+                <a:spcPts val="500"/>
+              </a:spcBef>
+              <a:buFont typeface="Arial" panose="020B0604020202020204" pitchFamily="34" charset="0"/>
+              <a:buChar char="•"/>
+              <a:defRPr sz="1800" kern="1200">
+                <a:solidFill>
+                  <a:schemeClr val="tx1"/>
+                </a:solidFill>
+                <a:latin typeface="+mn-lt"/>
+                <a:ea typeface="+mn-ea"/>
+                <a:cs typeface="+mn-cs"/>
+              </a:defRPr>
+            </a:lvl8pPr>
+            <a:lvl9pPr marL="3886200" indent="-228600" algn="l" defTabSz="914400" rtl="0" eaLnBrk="1" latinLnBrk="0" hangingPunct="1">
+              <a:lnSpc>
+                <a:spcPct val="90000"/>
+              </a:lnSpc>
+              <a:spcBef>
+                <a:spcPts val="500"/>
+              </a:spcBef>
+              <a:buFont typeface="Arial" panose="020B0604020202020204" pitchFamily="34" charset="0"/>
+              <a:buChar char="•"/>
+              <a:defRPr sz="1800" kern="1200">
+                <a:solidFill>
+                  <a:schemeClr val="tx1"/>
+                </a:solidFill>
+                <a:latin typeface="+mn-lt"/>
+                <a:ea typeface="+mn-ea"/>
+                <a:cs typeface="+mn-cs"/>
+              </a:defRPr>
+            </a:lvl9pPr>
+          </a:lstStyle>
+          <a:p>
+            <a:pPr marL="514350" indent="-514350">
+              <a:spcBef>
+                <a:spcPts val="2000"/>
+              </a:spcBef>
+              <a:buFont typeface="+mj-lt"/>
+              <a:buAutoNum type="arabicPeriod"/>
+            </a:pPr>
+            <a:r>
+              <a:rPr lang="ru-RU" sz="2400" b="1" dirty="0">
+                <a:latin typeface="Segoe UI Light" panose="020B0502040204020203" pitchFamily="34" charset="0"/>
+                <a:cs typeface="Segoe UI Light" panose="020B0502040204020203" pitchFamily="34" charset="0"/>
+              </a:rPr>
+              <a:t>Разрешение лексической многозначности происходит</a:t>
+            </a:r>
+            <a:r>
+              <a:rPr lang="en-US" sz="2400" b="1" dirty="0">
+                <a:latin typeface="Segoe UI Light" panose="020B0502040204020203" pitchFamily="34" charset="0"/>
+                <a:cs typeface="Segoe UI Light" panose="020B0502040204020203" pitchFamily="34" charset="0"/>
+              </a:rPr>
+              <a:t> </a:t>
+            </a:r>
+            <a:r>
+              <a:rPr lang="ru-RU" sz="2400" b="1" dirty="0">
+                <a:latin typeface="Segoe UI Light" panose="020B0502040204020203" pitchFamily="34" charset="0"/>
+                <a:cs typeface="Segoe UI Light" panose="020B0502040204020203" pitchFamily="34" charset="0"/>
+              </a:rPr>
+              <a:t>по методу Леска. </a:t>
+            </a:r>
+            <a:endParaRPr lang="ru-RU" sz="2400" b="1" dirty="0" smtClean="0">
+              <a:latin typeface="Segoe UI Light" panose="020B0502040204020203" pitchFamily="34" charset="0"/>
+              <a:cs typeface="Segoe UI Light" panose="020B0502040204020203" pitchFamily="34" charset="0"/>
+            </a:endParaRPr>
+          </a:p>
+          <a:p>
+            <a:pPr marL="514350" indent="-514350">
+              <a:lnSpc>
+                <a:spcPct val="120000"/>
+              </a:lnSpc>
+              <a:spcBef>
+                <a:spcPts val="2000"/>
+              </a:spcBef>
+              <a:buFont typeface="+mj-lt"/>
+              <a:buAutoNum type="arabicPeriod"/>
+            </a:pPr>
+            <a:r>
+              <a:rPr lang="ru-RU" sz="2400" b="1" dirty="0" smtClean="0">
+                <a:latin typeface="Segoe UI Light" panose="020B0502040204020203" pitchFamily="34" charset="0"/>
+                <a:cs typeface="Segoe UI Light" panose="020B0502040204020203" pitchFamily="34" charset="0"/>
+              </a:rPr>
+              <a:t>В качестве внешнего источника знаний используется </a:t>
+            </a:r>
+            <a:r>
+              <a:rPr lang="en-US" sz="2400" b="1" dirty="0" err="1" smtClean="0">
+                <a:latin typeface="Segoe UI Light" panose="020B0502040204020203" pitchFamily="34" charset="0"/>
+                <a:cs typeface="Segoe UI Light" panose="020B0502040204020203" pitchFamily="34" charset="0"/>
+              </a:rPr>
+              <a:t>BabelNet</a:t>
+            </a:r>
+            <a:r>
+              <a:rPr lang="en-US" sz="2400" b="1" dirty="0" smtClean="0">
+                <a:latin typeface="Segoe UI Light" panose="020B0502040204020203" pitchFamily="34" charset="0"/>
+                <a:cs typeface="Segoe UI Light" panose="020B0502040204020203" pitchFamily="34" charset="0"/>
+              </a:rPr>
+              <a:t>.</a:t>
+            </a:r>
+            <a:r>
+              <a:rPr lang="ru-RU" sz="2400" b="1" dirty="0" smtClean="0">
+                <a:latin typeface="Segoe UI Light" panose="020B0502040204020203" pitchFamily="34" charset="0"/>
+                <a:cs typeface="Segoe UI Light" panose="020B0502040204020203" pitchFamily="34" charset="0"/>
+              </a:rPr>
+              <a:t/>
+            </a:r>
+            <a:br>
+              <a:rPr lang="ru-RU" sz="2400" b="1" dirty="0" smtClean="0">
+                <a:latin typeface="Segoe UI Light" panose="020B0502040204020203" pitchFamily="34" charset="0"/>
+                <a:cs typeface="Segoe UI Light" panose="020B0502040204020203" pitchFamily="34" charset="0"/>
+              </a:rPr>
+            </a:br>
+            <a:r>
+              <a:rPr lang="ru-RU" sz="2400" b="1" dirty="0" smtClean="0">
+                <a:latin typeface="Segoe UI Light" panose="020B0502040204020203" pitchFamily="34" charset="0"/>
+                <a:cs typeface="Segoe UI Light" panose="020B0502040204020203" pitchFamily="34" charset="0"/>
+              </a:rPr>
+              <a:t>На 13.05.2017 </a:t>
+            </a:r>
+            <a:r>
+              <a:rPr lang="en-US" sz="2400" b="1" dirty="0" err="1" smtClean="0">
+                <a:latin typeface="Segoe UI Light" panose="020B0502040204020203" pitchFamily="34" charset="0"/>
+                <a:cs typeface="Segoe UI Light" panose="020B0502040204020203" pitchFamily="34" charset="0"/>
+              </a:rPr>
+              <a:t>BabelNet</a:t>
+            </a:r>
+            <a:r>
+              <a:rPr lang="en-US" sz="2400" b="1" dirty="0" smtClean="0">
+                <a:latin typeface="Segoe UI Light" panose="020B0502040204020203" pitchFamily="34" charset="0"/>
+                <a:cs typeface="Segoe UI Light" panose="020B0502040204020203" pitchFamily="34" charset="0"/>
+              </a:rPr>
+              <a:t> </a:t>
+            </a:r>
+            <a:r>
+              <a:rPr lang="ru-RU" sz="2400" b="1" dirty="0" smtClean="0">
+                <a:latin typeface="Segoe UI Light" panose="020B0502040204020203" pitchFamily="34" charset="0"/>
+                <a:cs typeface="Segoe UI Light" panose="020B0502040204020203" pitchFamily="34" charset="0"/>
+              </a:rPr>
+              <a:t>интегрировал в себе: </a:t>
+            </a:r>
+          </a:p>
+          <a:p>
+            <a:pPr lvl="2"/>
+            <a:r>
+              <a:rPr lang="en-US" sz="2200" b="1" dirty="0" smtClean="0">
+                <a:latin typeface="Segoe UI Light" panose="020B0502040204020203" pitchFamily="34" charset="0"/>
+                <a:cs typeface="Segoe UI Light" panose="020B0502040204020203" pitchFamily="34" charset="0"/>
+              </a:rPr>
+              <a:t>WordNet </a:t>
+            </a:r>
+            <a:r>
+              <a:rPr lang="en-US" sz="2200" b="1" dirty="0">
+                <a:latin typeface="Segoe UI Light" panose="020B0502040204020203" pitchFamily="34" charset="0"/>
+                <a:cs typeface="Segoe UI Light" panose="020B0502040204020203" pitchFamily="34" charset="0"/>
+              </a:rPr>
+              <a:t>(</a:t>
+            </a:r>
+            <a:r>
+              <a:rPr lang="ru-RU" sz="2200" b="1" dirty="0">
+                <a:latin typeface="Segoe UI Light" panose="020B0502040204020203" pitchFamily="34" charset="0"/>
+                <a:cs typeface="Segoe UI Light" panose="020B0502040204020203" pitchFamily="34" charset="0"/>
+              </a:rPr>
+              <a:t>версия 3.0), </a:t>
+            </a:r>
+          </a:p>
+          <a:p>
+            <a:pPr lvl="2"/>
+            <a:r>
+              <a:rPr lang="en-US" sz="2200" b="1" dirty="0">
+                <a:latin typeface="Segoe UI Light" panose="020B0502040204020203" pitchFamily="34" charset="0"/>
+                <a:cs typeface="Segoe UI Light" panose="020B0502040204020203" pitchFamily="34" charset="0"/>
+              </a:rPr>
+              <a:t>Open Multilingual WordNet (</a:t>
+            </a:r>
+            <a:r>
+              <a:rPr lang="ru-RU" sz="2200" b="1" dirty="0">
+                <a:latin typeface="Segoe UI Light" panose="020B0502040204020203" pitchFamily="34" charset="0"/>
+                <a:cs typeface="Segoe UI Light" panose="020B0502040204020203" pitchFamily="34" charset="0"/>
+              </a:rPr>
+              <a:t>январь 2017), </a:t>
+            </a:r>
+          </a:p>
+          <a:p>
+            <a:pPr lvl="2"/>
+            <a:r>
+              <a:rPr lang="en-US" sz="2200" b="1" dirty="0">
+                <a:latin typeface="Segoe UI Light" panose="020B0502040204020203" pitchFamily="34" charset="0"/>
+                <a:cs typeface="Segoe UI Light" panose="020B0502040204020203" pitchFamily="34" charset="0"/>
+              </a:rPr>
+              <a:t>Wikipedia (</a:t>
+            </a:r>
+            <a:r>
+              <a:rPr lang="ru-RU" sz="2200" b="1" dirty="0">
+                <a:latin typeface="Segoe UI Light" panose="020B0502040204020203" pitchFamily="34" charset="0"/>
+                <a:cs typeface="Segoe UI Light" panose="020B0502040204020203" pitchFamily="34" charset="0"/>
+              </a:rPr>
+              <a:t>январь 2017)</a:t>
+            </a:r>
+          </a:p>
+          <a:p>
+            <a:pPr lvl="2"/>
+            <a:r>
+              <a:rPr lang="ru-RU" sz="2200" b="1" dirty="0">
+                <a:latin typeface="Segoe UI Light" panose="020B0502040204020203" pitchFamily="34" charset="0"/>
+                <a:cs typeface="Segoe UI Light" panose="020B0502040204020203" pitchFamily="34" charset="0"/>
+              </a:rPr>
+              <a:t>...</a:t>
+            </a:r>
+            <a:endParaRPr lang="ru-RU" sz="2200" b="1" dirty="0" smtClean="0">
+              <a:latin typeface="Segoe UI Light" panose="020B0502040204020203" pitchFamily="34" charset="0"/>
+              <a:cs typeface="Segoe UI Light" panose="020B0502040204020203" pitchFamily="34" charset="0"/>
+            </a:endParaRPr>
+          </a:p>
+          <a:p>
+            <a:endParaRPr lang="ru-RU" sz="2400" b="1" dirty="0" smtClean="0">
               <a:latin typeface="Segoe UI Light" panose="020B0502040204020203" pitchFamily="34" charset="0"/>
               <a:cs typeface="Segoe UI Light" panose="020B0502040204020203" pitchFamily="34" charset="0"/>
             </a:endParaRPr>

</xml_diff>

<commit_message>
presentation: add conclusion and introduction
</commit_message>
<xml_diff>
--- a/presentetion.pptx
+++ b/presentetion.pptx
@@ -5409,8 +5409,8 @@
         </p:nvSpPr>
         <p:spPr>
           <a:xfrm>
-            <a:off x="838200" y="2031054"/>
-            <a:ext cx="10515600" cy="4145909"/>
+            <a:off x="671946" y="2031054"/>
+            <a:ext cx="10758054" cy="4646814"/>
           </a:xfrm>
           <a:prstGeom prst="rect">
             <a:avLst/>
@@ -5599,29 +5599,38 @@
           </a:lstStyle>
           <a:p>
             <a:r>
-              <a:rPr lang="ru-RU" b="1" dirty="0" smtClean="0">
-                <a:latin typeface="Segoe UI Light" panose="020B0502040204020203" pitchFamily="34" charset="0"/>
-                <a:cs typeface="Segoe UI Light" panose="020B0502040204020203" pitchFamily="34" charset="0"/>
-              </a:rPr>
-              <a:t>Построена система автоматизированного сбора данных из социальных сетей, поддерживающая интерфейс для данных из других систем, таких как собственные базы данных компаний.</a:t>
-            </a:r>
-          </a:p>
-          <a:p>
-            <a:r>
-              <a:rPr lang="ru-RU" b="1" dirty="0" smtClean="0">
-                <a:latin typeface="Segoe UI Light" panose="020B0502040204020203" pitchFamily="34" charset="0"/>
-                <a:cs typeface="Segoe UI Light" panose="020B0502040204020203" pitchFamily="34" charset="0"/>
-              </a:rPr>
-              <a:t>Построена система анализа полученных данных, позволяющая предсказывать поведение рынка пассажирских перевозок.</a:t>
-            </a:r>
-          </a:p>
-          <a:p>
-            <a:r>
-              <a:rPr lang="ru-RU" b="1" dirty="0" smtClean="0">
-                <a:latin typeface="Segoe UI Light" panose="020B0502040204020203" pitchFamily="34" charset="0"/>
-                <a:cs typeface="Segoe UI Light" panose="020B0502040204020203" pitchFamily="34" charset="0"/>
-              </a:rPr>
-              <a:t>Результаты анализа визуализированы в виде интерактивной карты и графиков, которые могут быть использованы сотрудниками компаний без специализированных знаний в области статистики.</a:t>
+              <a:rPr lang="ru-RU" b="1" dirty="0">
+                <a:latin typeface="Segoe UI Light" panose="020B0502040204020203" pitchFamily="34" charset="0"/>
+                <a:cs typeface="Segoe UI Light" panose="020B0502040204020203" pitchFamily="34" charset="0"/>
+              </a:rPr>
+              <a:t>Выполнен анализ сервисов, предоставляющих возможность извлечения ключевой информации из текста;</a:t>
+            </a:r>
+          </a:p>
+          <a:p>
+            <a:r>
+              <a:rPr lang="ru-RU" b="1" dirty="0">
+                <a:latin typeface="Segoe UI Light" panose="020B0502040204020203" pitchFamily="34" charset="0"/>
+                <a:cs typeface="Segoe UI Light" panose="020B0502040204020203" pitchFamily="34" charset="0"/>
+              </a:rPr>
+              <a:t>Исследованы алгоритмы, применяющиеся для разрешения лексической многозначности при переводе слов;</a:t>
+            </a:r>
+          </a:p>
+          <a:p>
+            <a:r>
+              <a:rPr lang="ru-RU" b="1" dirty="0">
+                <a:latin typeface="Segoe UI Light" panose="020B0502040204020203" pitchFamily="34" charset="0"/>
+                <a:cs typeface="Segoe UI Light" panose="020B0502040204020203" pitchFamily="34" charset="0"/>
+              </a:rPr>
+              <a:t>Построена структурно-функциональную схему системы поиска релевантных документов;</a:t>
+            </a:r>
+          </a:p>
+          <a:p>
+            <a:r>
+              <a:rPr lang="ru-RU" b="1" dirty="0">
+                <a:latin typeface="Segoe UI Light" panose="020B0502040204020203" pitchFamily="34" charset="0"/>
+                <a:cs typeface="Segoe UI Light" panose="020B0502040204020203" pitchFamily="34" charset="0"/>
+              </a:rPr>
+              <a:t>Разработано мобильное приложение под ОС Android, обеспечивающего поиск в сети интернет по заданному текстовому документу/веб-странице релевантных ему документов, в том числе представленных на языке отличном от языка входных данных.</a:t>
             </a:r>
             <a:endParaRPr lang="en-US" b="1" dirty="0">
               <a:latin typeface="Segoe UI Light" panose="020B0502040204020203" pitchFamily="34" charset="0"/>
@@ -6492,8 +6501,8 @@
         </p:nvSpPr>
         <p:spPr>
           <a:xfrm>
-            <a:off x="838200" y="2031054"/>
-            <a:ext cx="10515600" cy="4145909"/>
+            <a:off x="1008611" y="2247183"/>
+            <a:ext cx="10305010" cy="4303245"/>
           </a:xfrm>
           <a:prstGeom prst="rect">
             <a:avLst/>
@@ -6681,21 +6690,85 @@
             </a:lvl9pPr>
           </a:lstStyle>
           <a:p>
+            <a:pPr marL="0" indent="0" algn="just">
+              <a:buNone/>
+            </a:pPr>
             <a:r>
               <a:rPr lang="ru-RU" sz="2400" b="1" dirty="0" smtClean="0">
                 <a:latin typeface="Segoe UI Light" panose="020B0502040204020203" pitchFamily="34" charset="0"/>
                 <a:cs typeface="Segoe UI Light" panose="020B0502040204020203" pitchFamily="34" charset="0"/>
               </a:rPr>
-              <a:t>Целью данной дипломной работы является разработка системы анализа рынка пассажирских перевозок на основе данных из социальных сетей. </a:t>
-            </a:r>
-          </a:p>
-          <a:p>
+              <a:t>	</a:t>
+            </a:r>
             <a:r>
               <a:rPr lang="ru-RU" sz="2400" b="1" dirty="0" smtClean="0">
-                <a:latin typeface="Segoe UI Light" panose="020B0502040204020203" pitchFamily="34" charset="0"/>
-                <a:cs typeface="Segoe UI Light" panose="020B0502040204020203" pitchFamily="34" charset="0"/>
-              </a:rPr>
-              <a:t>Для поставленной цели необходимо решить следующие задачи:</a:t>
+                <a:latin typeface="Times New Roman" panose="02020603050405020304" pitchFamily="18" charset="0"/>
+                <a:cs typeface="Times New Roman" panose="02020603050405020304" pitchFamily="18" charset="0"/>
+              </a:rPr>
+              <a:t>Целью</a:t>
+            </a:r>
+            <a:r>
+              <a:rPr lang="ru-RU" sz="2400" b="1" dirty="0" smtClean="0">
+                <a:latin typeface="Segoe UI Light" panose="020B0502040204020203" pitchFamily="34" charset="0"/>
+                <a:cs typeface="Segoe UI Light" panose="020B0502040204020203" pitchFamily="34" charset="0"/>
+              </a:rPr>
+              <a:t> </a:t>
+            </a:r>
+            <a:r>
+              <a:rPr lang="ru-RU" sz="2400" b="1" dirty="0">
+                <a:latin typeface="Segoe UI Light" panose="020B0502040204020203" pitchFamily="34" charset="0"/>
+                <a:cs typeface="Segoe UI Light" panose="020B0502040204020203" pitchFamily="34" charset="0"/>
+              </a:rPr>
+              <a:t>данной дипломной работы является разработка мобильного приложение, обеспечивающего поиск в сети интернет по заданному текстовому документу/веб-странице релевантных ему документов, в том числе представленных на языке отличном от </a:t>
+            </a:r>
+            <a:r>
+              <a:rPr lang="ru-RU" sz="2400" b="1" dirty="0" smtClean="0">
+                <a:latin typeface="Segoe UI Light" panose="020B0502040204020203" pitchFamily="34" charset="0"/>
+                <a:cs typeface="Segoe UI Light" panose="020B0502040204020203" pitchFamily="34" charset="0"/>
+              </a:rPr>
+              <a:t>языка входных данных.</a:t>
+            </a:r>
+          </a:p>
+          <a:p>
+            <a:pPr marL="0" indent="0">
+              <a:buNone/>
+            </a:pPr>
+            <a:endParaRPr lang="ru-RU" sz="2400" b="1" dirty="0" smtClean="0">
+              <a:latin typeface="Segoe UI Light" panose="020B0502040204020203" pitchFamily="34" charset="0"/>
+              <a:cs typeface="Segoe UI Light" panose="020B0502040204020203" pitchFamily="34" charset="0"/>
+            </a:endParaRPr>
+          </a:p>
+          <a:p>
+            <a:pPr marL="0" indent="0">
+              <a:buNone/>
+            </a:pPr>
+            <a:r>
+              <a:rPr lang="ru-RU" sz="2400" b="1" dirty="0" smtClean="0">
+                <a:latin typeface="Segoe UI Light" panose="020B0502040204020203" pitchFamily="34" charset="0"/>
+                <a:cs typeface="Segoe UI Light" panose="020B0502040204020203" pitchFamily="34" charset="0"/>
+              </a:rPr>
+              <a:t>	Для </a:t>
+            </a:r>
+            <a:r>
+              <a:rPr lang="ru-RU" sz="2400" b="1" dirty="0">
+                <a:latin typeface="Segoe UI Light" panose="020B0502040204020203" pitchFamily="34" charset="0"/>
+                <a:cs typeface="Segoe UI Light" panose="020B0502040204020203" pitchFamily="34" charset="0"/>
+              </a:rPr>
+              <a:t>достижения поставленной цели необходимо решить следующие </a:t>
+            </a:r>
+            <a:r>
+              <a:rPr lang="ru-RU" sz="2400" b="1" dirty="0">
+                <a:latin typeface="Times New Roman" panose="02020603050405020304" pitchFamily="18" charset="0"/>
+                <a:cs typeface="Times New Roman" panose="02020603050405020304" pitchFamily="18" charset="0"/>
+              </a:rPr>
+              <a:t>задачи</a:t>
+            </a:r>
+            <a:r>
+              <a:rPr lang="ru-RU" sz="2400" b="1" dirty="0" smtClean="0">
+                <a:latin typeface="Segoe UI Light" panose="020B0502040204020203" pitchFamily="34" charset="0"/>
+                <a:cs typeface="Segoe UI Light" panose="020B0502040204020203" pitchFamily="34" charset="0"/>
+              </a:rPr>
+              <a:t>: </a:t>
             </a:r>
           </a:p>
           <a:p>
@@ -6704,11 +6777,18 @@
               <a:buAutoNum type="arabicPeriod"/>
             </a:pPr>
             <a:r>
+              <a:rPr lang="ru-RU" sz="2000" b="1" dirty="0">
+                <a:latin typeface="Segoe UI Light" panose="020B0502040204020203" pitchFamily="34" charset="0"/>
+                <a:cs typeface="Segoe UI Light" panose="020B0502040204020203" pitchFamily="34" charset="0"/>
+              </a:rPr>
+              <a:t>Разработать алгоритм составления ПОД</a:t>
+            </a:r>
+            <a:r>
               <a:rPr lang="ru-RU" sz="2000" b="1" dirty="0" smtClean="0">
                 <a:latin typeface="Segoe UI Light" panose="020B0502040204020203" pitchFamily="34" charset="0"/>
                 <a:cs typeface="Segoe UI Light" panose="020B0502040204020203" pitchFamily="34" charset="0"/>
               </a:rPr>
-              <a:t>Изучить предметную область, включая существующие методы анализа рынка пассажирских перевозок.</a:t>
+              <a:t>;</a:t>
             </a:r>
           </a:p>
           <a:p>
@@ -6717,11 +6797,18 @@
               <a:buAutoNum type="arabicPeriod"/>
             </a:pPr>
             <a:r>
+              <a:rPr lang="ru-RU" sz="2000" b="1" dirty="0">
+                <a:latin typeface="Segoe UI Light" panose="020B0502040204020203" pitchFamily="34" charset="0"/>
+                <a:cs typeface="Segoe UI Light" panose="020B0502040204020203" pitchFamily="34" charset="0"/>
+              </a:rPr>
+              <a:t>Разработать алгоритм разрешения лексической многозначности при переводе</a:t>
+            </a:r>
+            <a:r>
               <a:rPr lang="ru-RU" sz="2000" b="1" dirty="0" smtClean="0">
                 <a:latin typeface="Segoe UI Light" panose="020B0502040204020203" pitchFamily="34" charset="0"/>
                 <a:cs typeface="Segoe UI Light" panose="020B0502040204020203" pitchFamily="34" charset="0"/>
               </a:rPr>
-              <a:t>Организовать сбор данных из социальных сетей, необходимых для анализа.</a:t>
+              <a:t>;</a:t>
             </a:r>
           </a:p>
           <a:p>
@@ -6730,11 +6817,18 @@
               <a:buAutoNum type="arabicPeriod"/>
             </a:pPr>
             <a:r>
+              <a:rPr lang="ru-RU" sz="2000" b="1" dirty="0">
+                <a:latin typeface="Segoe UI Light" panose="020B0502040204020203" pitchFamily="34" charset="0"/>
+                <a:cs typeface="Segoe UI Light" panose="020B0502040204020203" pitchFamily="34" charset="0"/>
+              </a:rPr>
+              <a:t>Разработать структурно-функциональную схему системы поиска релевантных документов</a:t>
+            </a:r>
+            <a:r>
               <a:rPr lang="ru-RU" sz="2000" b="1" dirty="0" smtClean="0">
                 <a:latin typeface="Segoe UI Light" panose="020B0502040204020203" pitchFamily="34" charset="0"/>
                 <a:cs typeface="Segoe UI Light" panose="020B0502040204020203" pitchFamily="34" charset="0"/>
               </a:rPr>
-              <a:t>Построить автоматизированную систему анализа полученных данных.</a:t>
+              <a:t>;</a:t>
             </a:r>
           </a:p>
           <a:p>
@@ -6743,11 +6837,11 @@
               <a:buAutoNum type="arabicPeriod"/>
             </a:pPr>
             <a:r>
-              <a:rPr lang="ru-RU" sz="2000" b="1" dirty="0" smtClean="0">
-                <a:latin typeface="Segoe UI Light" panose="020B0502040204020203" pitchFamily="34" charset="0"/>
-                <a:cs typeface="Segoe UI Light" panose="020B0502040204020203" pitchFamily="34" charset="0"/>
-              </a:rPr>
-              <a:t>Визуализировать результаты анализа для использования их при последующем планировании.</a:t>
+              <a:rPr lang="ru-RU" sz="2000" b="1" dirty="0">
+                <a:latin typeface="Segoe UI Light" panose="020B0502040204020203" pitchFamily="34" charset="0"/>
+                <a:cs typeface="Segoe UI Light" panose="020B0502040204020203" pitchFamily="34" charset="0"/>
+              </a:rPr>
+              <a:t>Реализовать мобильное приложение.</a:t>
             </a:r>
             <a:endParaRPr lang="en-US" b="1" dirty="0">
               <a:latin typeface="Segoe UI Light" panose="020B0502040204020203" pitchFamily="34" charset="0"/>
@@ -7812,7 +7906,7 @@
         </p:nvSpPr>
         <p:spPr>
           <a:xfrm>
-            <a:off x="1647008" y="2471629"/>
+            <a:off x="1647008" y="2804139"/>
             <a:ext cx="8854440" cy="2906706"/>
           </a:xfrm>
           <a:prstGeom prst="rect">

</xml_diff>